<commit_message>
Updates to the 03 module to add remaining titles
</commit_message>
<xml_diff>
--- a/03-creating_a_custom_resource-linux.pptx
+++ b/03-creating_a_custom_resource-linux.pptx
@@ -63,10 +63,10 @@
     <p:sldId id="334" r:id="rId55"/>
     <p:sldId id="325" r:id="rId56"/>
     <p:sldId id="335" r:id="rId57"/>
-    <p:sldId id="326" r:id="rId58"/>
-    <p:sldId id="327" r:id="rId59"/>
+    <p:sldId id="327" r:id="rId58"/>
+    <p:sldId id="326" r:id="rId59"/>
     <p:sldId id="328" r:id="rId60"/>
-    <p:sldId id="333" r:id="rId61"/>
+    <p:sldId id="336" r:id="rId61"/>
     <p:sldId id="264" r:id="rId62"/>
     <p:sldId id="266" r:id="rId63"/>
     <p:sldId id="265" r:id="rId64"/>
@@ -331,7 +331,7 @@
               <a:pPr>
                 <a:defRPr/>
               </a:pPr>
-              <a:t>2016-03-10</a:t>
+              <a:t>2016-06-06</a:t>
             </a:fld>
             <a:endParaRPr lang="en-US" dirty="0"/>
           </a:p>
@@ -514,7 +514,7 @@
               <a:pPr>
                 <a:defRPr/>
               </a:pPr>
-              <a:t>2016-03-10</a:t>
+              <a:t>2016-06-06</a:t>
             </a:fld>
             <a:endParaRPr lang="en-US" dirty="0"/>
           </a:p>
@@ -2689,6 +2689,294 @@
 </file>
 
 <file path=ppt/slideLayouts/slideLayout14.xml><?xml version="1.0" encoding="utf-8"?>
+<p:sldLayout xmlns:a="http://schemas.openxmlformats.org/drawingml/2006/main" xmlns:r="http://schemas.openxmlformats.org/officeDocument/2006/relationships" xmlns:p="http://schemas.openxmlformats.org/presentationml/2006/main" userDrawn="1">
+  <p:cSld name="Lab">
+    <p:spTree>
+      <p:nvGrpSpPr>
+        <p:cNvPr id="1" name=""/>
+        <p:cNvGrpSpPr/>
+        <p:nvPr/>
+      </p:nvGrpSpPr>
+      <p:grpSpPr>
+        <a:xfrm>
+          <a:off x="0" y="0"/>
+          <a:ext cx="0" cy="0"/>
+          <a:chOff x="0" y="0"/>
+          <a:chExt cx="0" cy="0"/>
+        </a:xfrm>
+      </p:grpSpPr>
+      <p:sp>
+        <p:nvSpPr>
+          <p:cNvPr id="5" name="TextBox 4"/>
+          <p:cNvSpPr txBox="1"/>
+          <p:nvPr/>
+        </p:nvSpPr>
+        <p:spPr bwMode="white">
+          <a:xfrm>
+            <a:off x="136961" y="144390"/>
+            <a:ext cx="12824551" cy="2378219"/>
+          </a:xfrm>
+          <a:prstGeom prst="rect">
+            <a:avLst/>
+          </a:prstGeom>
+          <a:noFill/>
+          <a:ln>
+            <a:noFill/>
+          </a:ln>
+          <a:effectLst/>
+        </p:spPr>
+        <p:txBody>
+          <a:bodyPr lIns="121920" tIns="121920" rIns="121920" bIns="121920" anchor="ctr"/>
+          <a:lstStyle/>
+          <a:p>
+            <a:pPr defTabSz="1219120" fontAlgn="auto">
+              <a:spcBef>
+                <a:spcPts val="0"/>
+              </a:spcBef>
+              <a:spcAft>
+                <a:spcPts val="0"/>
+              </a:spcAft>
+              <a:defRPr/>
+            </a:pPr>
+            <a:r>
+              <a:rPr lang="en-US" sz="16933" dirty="0">
+                <a:ln w="18415" cmpd="sng">
+                  <a:solidFill>
+                    <a:srgbClr val="FFFFFF"/>
+                  </a:solidFill>
+                  <a:prstDash val="solid"/>
+                </a:ln>
+                <a:solidFill>
+                  <a:schemeClr val="bg2">
+                    <a:lumMod val="95000"/>
+                    <a:alpha val="50000"/>
+                  </a:schemeClr>
+                </a:solidFill>
+                <a:latin typeface="+mn-lt"/>
+                <a:ea typeface="+mn-ea"/>
+                <a:cs typeface="+mn-cs"/>
+              </a:rPr>
+              <a:t>LAB</a:t>
+            </a:r>
+          </a:p>
+        </p:txBody>
+      </p:sp>
+      <p:pic>
+        <p:nvPicPr>
+          <p:cNvPr id="2" name="Picture 1" descr="lab.gif"/>
+          <p:cNvPicPr>
+            <a:picLocks noChangeAspect="1"/>
+          </p:cNvPicPr>
+          <p:nvPr userDrawn="1"/>
+        </p:nvPicPr>
+        <p:blipFill>
+          <a:blip r:embed="rId2">
+            <a:extLst>
+              <a:ext uri="{28A0092B-C50C-407E-A947-70E740481C1C}">
+                <a14:useLocalDpi xmlns:a14="http://schemas.microsoft.com/office/drawing/2010/main" val="0"/>
+              </a:ext>
+            </a:extLst>
+          </a:blip>
+          <a:stretch>
+            <a:fillRect/>
+          </a:stretch>
+        </p:blipFill>
+        <p:spPr>
+          <a:xfrm>
+            <a:off x="13274049" y="215274"/>
+            <a:ext cx="2407901" cy="2407901"/>
+          </a:xfrm>
+          <a:prstGeom prst="rect">
+            <a:avLst/>
+          </a:prstGeom>
+        </p:spPr>
+      </p:pic>
+      <p:sp>
+        <p:nvSpPr>
+          <p:cNvPr id="6" name="Title 1"/>
+          <p:cNvSpPr>
+            <a:spLocks noGrp="1"/>
+          </p:cNvSpPr>
+          <p:nvPr>
+            <p:ph type="ctrTitle" hasCustomPrompt="1"/>
+          </p:nvPr>
+        </p:nvSpPr>
+        <p:spPr bwMode="white">
+          <a:xfrm>
+            <a:off x="1660524" y="2294619"/>
+            <a:ext cx="12330113" cy="852712"/>
+          </a:xfrm>
+        </p:spPr>
+        <p:txBody>
+          <a:bodyPr lIns="91440" tIns="91440" rIns="91440" bIns="91440" anchor="ctr"/>
+          <a:lstStyle>
+            <a:lvl1pPr>
+              <a:lnSpc>
+                <a:spcPct val="90000"/>
+              </a:lnSpc>
+              <a:defRPr sz="6400" b="1" spc="0" baseline="0">
+                <a:solidFill>
+                  <a:schemeClr val="accent1"/>
+                </a:solidFill>
+              </a:defRPr>
+            </a:lvl1pPr>
+          </a:lstStyle>
+          <a:p>
+            <a:r>
+              <a:rPr lang="en-US" dirty="0" smtClean="0"/>
+              <a:t>Lab</a:t>
+            </a:r>
+            <a:endParaRPr lang="en-US" dirty="0"/>
+          </a:p>
+        </p:txBody>
+      </p:sp>
+      <p:sp>
+        <p:nvSpPr>
+          <p:cNvPr id="10" name="Subtitle 2"/>
+          <p:cNvSpPr>
+            <a:spLocks noGrp="1"/>
+          </p:cNvSpPr>
+          <p:nvPr>
+            <p:ph type="subTitle" idx="1"/>
+          </p:nvPr>
+        </p:nvSpPr>
+        <p:spPr bwMode="white">
+          <a:xfrm>
+            <a:off x="1671638" y="3260725"/>
+            <a:ext cx="12319000" cy="3346421"/>
+          </a:xfrm>
+          <a:prstGeom prst="rect">
+            <a:avLst/>
+          </a:prstGeom>
+        </p:spPr>
+        <p:txBody>
+          <a:bodyPr lIns="91440" tIns="91440" rIns="91440" bIns="91440">
+            <a:noAutofit/>
+          </a:bodyPr>
+          <a:lstStyle>
+            <a:lvl1pPr marL="571500" indent="-571500" algn="l">
+              <a:lnSpc>
+                <a:spcPct val="100000"/>
+              </a:lnSpc>
+              <a:spcBef>
+                <a:spcPts val="0"/>
+              </a:spcBef>
+              <a:buFont typeface="Wingdings" charset="2"/>
+              <a:buChar char="q"/>
+              <a:defRPr sz="2800" baseline="0">
+                <a:solidFill>
+                  <a:schemeClr val="accent3">
+                    <a:lumMod val="50000"/>
+                  </a:schemeClr>
+                </a:solidFill>
+              </a:defRPr>
+            </a:lvl1pPr>
+            <a:lvl2pPr marL="609561" indent="0" algn="ctr">
+              <a:buNone/>
+              <a:defRPr>
+                <a:solidFill>
+                  <a:schemeClr val="tx1">
+                    <a:tint val="75000"/>
+                  </a:schemeClr>
+                </a:solidFill>
+              </a:defRPr>
+            </a:lvl2pPr>
+            <a:lvl3pPr marL="1219120" indent="0" algn="ctr">
+              <a:buNone/>
+              <a:defRPr>
+                <a:solidFill>
+                  <a:schemeClr val="tx1">
+                    <a:tint val="75000"/>
+                  </a:schemeClr>
+                </a:solidFill>
+              </a:defRPr>
+            </a:lvl3pPr>
+            <a:lvl4pPr marL="1828681" indent="0" algn="ctr">
+              <a:buNone/>
+              <a:defRPr>
+                <a:solidFill>
+                  <a:schemeClr val="tx1">
+                    <a:tint val="75000"/>
+                  </a:schemeClr>
+                </a:solidFill>
+              </a:defRPr>
+            </a:lvl4pPr>
+            <a:lvl5pPr marL="2438242" indent="0" algn="ctr">
+              <a:buNone/>
+              <a:defRPr>
+                <a:solidFill>
+                  <a:schemeClr val="tx1">
+                    <a:tint val="75000"/>
+                  </a:schemeClr>
+                </a:solidFill>
+              </a:defRPr>
+            </a:lvl5pPr>
+            <a:lvl6pPr marL="3047802" indent="0" algn="ctr">
+              <a:buNone/>
+              <a:defRPr>
+                <a:solidFill>
+                  <a:schemeClr val="tx1">
+                    <a:tint val="75000"/>
+                  </a:schemeClr>
+                </a:solidFill>
+              </a:defRPr>
+            </a:lvl6pPr>
+            <a:lvl7pPr marL="3657362" indent="0" algn="ctr">
+              <a:buNone/>
+              <a:defRPr>
+                <a:solidFill>
+                  <a:schemeClr val="tx1">
+                    <a:tint val="75000"/>
+                  </a:schemeClr>
+                </a:solidFill>
+              </a:defRPr>
+            </a:lvl7pPr>
+            <a:lvl8pPr marL="4266923" indent="0" algn="ctr">
+              <a:buNone/>
+              <a:defRPr>
+                <a:solidFill>
+                  <a:schemeClr val="tx1">
+                    <a:tint val="75000"/>
+                  </a:schemeClr>
+                </a:solidFill>
+              </a:defRPr>
+            </a:lvl8pPr>
+            <a:lvl9pPr marL="4876483" indent="0" algn="ctr">
+              <a:buNone/>
+              <a:defRPr>
+                <a:solidFill>
+                  <a:schemeClr val="tx1">
+                    <a:tint val="75000"/>
+                  </a:schemeClr>
+                </a:solidFill>
+              </a:defRPr>
+            </a:lvl9pPr>
+          </a:lstStyle>
+          <a:p>
+            <a:r>
+              <a:rPr lang="en-US" dirty="0" smtClean="0"/>
+              <a:t>Click to edit Master subtitle style</a:t>
+            </a:r>
+          </a:p>
+        </p:txBody>
+      </p:sp>
+    </p:spTree>
+    <p:extLst>
+      <p:ext uri="{BB962C8B-B14F-4D97-AF65-F5344CB8AC3E}">
+        <p14:creationId xmlns:p14="http://schemas.microsoft.com/office/powerpoint/2010/main" val="1852188546"/>
+      </p:ext>
+    </p:extLst>
+  </p:cSld>
+  <p:clrMapOvr>
+    <a:masterClrMapping/>
+  </p:clrMapOvr>
+  <p:transition spd="med">
+    <p:fade/>
+  </p:transition>
+</p:sldLayout>
+</file>
+
+<file path=ppt/slideLayouts/slideLayout15.xml><?xml version="1.0" encoding="utf-8"?>
 <p:sldLayout xmlns:a="http://schemas.openxmlformats.org/drawingml/2006/main" xmlns:r="http://schemas.openxmlformats.org/officeDocument/2006/relationships" xmlns:p="http://schemas.openxmlformats.org/presentationml/2006/main" preserve="1" userDrawn="1">
   <p:cSld name="Motivation">
     <p:spTree>
@@ -2975,7 +3263,7 @@
 </p:sldLayout>
 </file>
 
-<file path=ppt/slideLayouts/slideLayout15.xml><?xml version="1.0" encoding="utf-8"?>
+<file path=ppt/slideLayouts/slideLayout16.xml><?xml version="1.0" encoding="utf-8"?>
 <p:sldLayout xmlns:a="http://schemas.openxmlformats.org/drawingml/2006/main" xmlns:r="http://schemas.openxmlformats.org/officeDocument/2006/relationships" xmlns:p="http://schemas.openxmlformats.org/presentationml/2006/main" preserve="1" userDrawn="1">
   <p:cSld name="Problem">
     <p:spTree>
@@ -3262,7 +3550,7 @@
 </p:sldLayout>
 </file>
 
-<file path=ppt/slideLayouts/slideLayout16.xml><?xml version="1.0" encoding="utf-8"?>
+<file path=ppt/slideLayouts/slideLayout17.xml><?xml version="1.0" encoding="utf-8"?>
 <p:sldLayout xmlns:a="http://schemas.openxmlformats.org/drawingml/2006/main" xmlns:r="http://schemas.openxmlformats.org/officeDocument/2006/relationships" xmlns:p="http://schemas.openxmlformats.org/presentationml/2006/main" preserve="1" userDrawn="1">
   <p:cSld name="Docs">
     <p:spTree>
@@ -3611,7 +3899,7 @@
 </p:sldLayout>
 </file>
 
-<file path=ppt/slideLayouts/slideLayout17.xml><?xml version="1.0" encoding="utf-8"?>
+<file path=ppt/slideLayouts/slideLayout18.xml><?xml version="1.0" encoding="utf-8"?>
 <p:sldLayout xmlns:a="http://schemas.openxmlformats.org/drawingml/2006/main" xmlns:r="http://schemas.openxmlformats.org/officeDocument/2006/relationships" xmlns:p="http://schemas.openxmlformats.org/presentationml/2006/main" preserve="1" userDrawn="1">
   <p:cSld name="Concept">
     <p:spTree>
@@ -3898,7 +4186,7 @@
 </p:sldLayout>
 </file>
 
-<file path=ppt/slideLayouts/slideLayout18.xml><?xml version="1.0" encoding="utf-8"?>
+<file path=ppt/slideLayouts/slideLayout19.xml><?xml version="1.0" encoding="utf-8"?>
 <p:sldLayout xmlns:a="http://schemas.openxmlformats.org/drawingml/2006/main" xmlns:r="http://schemas.openxmlformats.org/officeDocument/2006/relationships" xmlns:p="http://schemas.openxmlformats.org/presentationml/2006/main" preserve="1" userDrawn="1">
   <p:cSld name="Group Exercise">
     <p:spTree>
@@ -4319,7 +4607,184 @@
 </p:sldLayout>
 </file>
 
-<file path=ppt/slideLayouts/slideLayout19.xml><?xml version="1.0" encoding="utf-8"?>
+<file path=ppt/slideLayouts/slideLayout2.xml><?xml version="1.0" encoding="utf-8"?>
+<p:sldLayout xmlns:a="http://schemas.openxmlformats.org/drawingml/2006/main" xmlns:r="http://schemas.openxmlformats.org/officeDocument/2006/relationships" xmlns:p="http://schemas.openxmlformats.org/presentationml/2006/main" preserve="1" userDrawn="1">
+  <p:cSld name="Standard">
+    <p:bg>
+      <p:bgPr>
+        <a:gradFill rotWithShape="0">
+          <a:gsLst>
+            <a:gs pos="0">
+              <a:schemeClr val="bg1"/>
+            </a:gs>
+            <a:gs pos="100000">
+              <a:schemeClr val="bg2"/>
+            </a:gs>
+          </a:gsLst>
+          <a:lin ang="5400000" scaled="1"/>
+        </a:gradFill>
+        <a:effectLst/>
+      </p:bgPr>
+    </p:bg>
+    <p:spTree>
+      <p:nvGrpSpPr>
+        <p:cNvPr id="1" name=""/>
+        <p:cNvGrpSpPr/>
+        <p:nvPr/>
+      </p:nvGrpSpPr>
+      <p:grpSpPr>
+        <a:xfrm>
+          <a:off x="0" y="0"/>
+          <a:ext cx="0" cy="0"/>
+          <a:chOff x="0" y="0"/>
+          <a:chExt cx="0" cy="0"/>
+        </a:xfrm>
+      </p:grpSpPr>
+      <p:sp>
+        <p:nvSpPr>
+          <p:cNvPr id="13" name="Title 12"/>
+          <p:cNvSpPr>
+            <a:spLocks noGrp="1"/>
+          </p:cNvSpPr>
+          <p:nvPr>
+            <p:ph type="title"/>
+          </p:nvPr>
+        </p:nvSpPr>
+        <p:spPr/>
+        <p:txBody>
+          <a:bodyPr/>
+          <a:lstStyle/>
+          <a:p>
+            <a:r>
+              <a:rPr lang="en-US" smtClean="0"/>
+              <a:t>Click to edit Master title style</a:t>
+            </a:r>
+            <a:endParaRPr lang="en-US" dirty="0"/>
+          </a:p>
+        </p:txBody>
+      </p:sp>
+      <p:sp>
+        <p:nvSpPr>
+          <p:cNvPr id="17" name="Text Placeholder 4"/>
+          <p:cNvSpPr>
+            <a:spLocks noGrp="1"/>
+          </p:cNvSpPr>
+          <p:nvPr>
+            <p:ph type="body" sz="quarter" idx="12"/>
+          </p:nvPr>
+        </p:nvSpPr>
+        <p:spPr>
+          <a:xfrm>
+            <a:off x="650040" y="1856198"/>
+            <a:ext cx="14898624" cy="5345953"/>
+          </a:xfrm>
+        </p:spPr>
+        <p:txBody>
+          <a:bodyPr>
+            <a:noAutofit/>
+          </a:bodyPr>
+          <a:lstStyle>
+            <a:lvl1pPr>
+              <a:spcAft>
+                <a:spcPts val="800"/>
+              </a:spcAft>
+              <a:defRPr baseline="0">
+                <a:solidFill>
+                  <a:schemeClr val="accent3">
+                    <a:lumMod val="50000"/>
+                  </a:schemeClr>
+                </a:solidFill>
+              </a:defRPr>
+            </a:lvl1pPr>
+            <a:lvl2pPr>
+              <a:spcAft>
+                <a:spcPts val="800"/>
+              </a:spcAft>
+              <a:defRPr baseline="0">
+                <a:solidFill>
+                  <a:schemeClr val="accent3">
+                    <a:lumMod val="50000"/>
+                  </a:schemeClr>
+                </a:solidFill>
+              </a:defRPr>
+            </a:lvl2pPr>
+            <a:lvl3pPr>
+              <a:spcAft>
+                <a:spcPts val="800"/>
+              </a:spcAft>
+              <a:defRPr baseline="0">
+                <a:solidFill>
+                  <a:schemeClr val="accent3">
+                    <a:lumMod val="50000"/>
+                  </a:schemeClr>
+                </a:solidFill>
+              </a:defRPr>
+            </a:lvl3pPr>
+            <a:lvl4pPr>
+              <a:spcAft>
+                <a:spcPts val="800"/>
+              </a:spcAft>
+              <a:defRPr baseline="0">
+                <a:solidFill>
+                  <a:schemeClr val="accent3">
+                    <a:lumMod val="50000"/>
+                  </a:schemeClr>
+                </a:solidFill>
+              </a:defRPr>
+            </a:lvl4pPr>
+            <a:lvl5pPr>
+              <a:spcAft>
+                <a:spcPts val="800"/>
+              </a:spcAft>
+              <a:defRPr baseline="0">
+                <a:solidFill>
+                  <a:schemeClr val="accent3">
+                    <a:lumMod val="50000"/>
+                  </a:schemeClr>
+                </a:solidFill>
+              </a:defRPr>
+            </a:lvl5pPr>
+          </a:lstStyle>
+          <a:p>
+            <a:pPr lvl="0"/>
+            <a:r>
+              <a:rPr lang="en-US" smtClean="0"/>
+              <a:t>Click to edit Master text styles</a:t>
+            </a:r>
+          </a:p>
+          <a:p>
+            <a:pPr lvl="1"/>
+            <a:r>
+              <a:rPr lang="en-US" smtClean="0"/>
+              <a:t>Second level</a:t>
+            </a:r>
+          </a:p>
+          <a:p>
+            <a:pPr lvl="2"/>
+            <a:r>
+              <a:rPr lang="en-US" smtClean="0"/>
+              <a:t>Third level</a:t>
+            </a:r>
+          </a:p>
+        </p:txBody>
+      </p:sp>
+    </p:spTree>
+    <p:extLst>
+      <p:ext uri="{BB962C8B-B14F-4D97-AF65-F5344CB8AC3E}">
+        <p14:creationId xmlns:p14="http://schemas.microsoft.com/office/powerpoint/2010/main" val="2747942789"/>
+      </p:ext>
+    </p:extLst>
+  </p:cSld>
+  <p:clrMapOvr>
+    <a:masterClrMapping/>
+  </p:clrMapOvr>
+  <p:transition spd="med">
+    <p:fade/>
+  </p:transition>
+</p:sldLayout>
+</file>
+
+<file path=ppt/slideLayouts/slideLayout20.xml><?xml version="1.0" encoding="utf-8"?>
 <p:sldLayout xmlns:a="http://schemas.openxmlformats.org/drawingml/2006/main" xmlns:r="http://schemas.openxmlformats.org/officeDocument/2006/relationships" xmlns:p="http://schemas.openxmlformats.org/presentationml/2006/main" preserve="1" userDrawn="1">
   <p:cSld name="Lab">
     <p:spTree>
@@ -4607,184 +5072,7 @@
 </p:sldLayout>
 </file>
 
-<file path=ppt/slideLayouts/slideLayout2.xml><?xml version="1.0" encoding="utf-8"?>
-<p:sldLayout xmlns:a="http://schemas.openxmlformats.org/drawingml/2006/main" xmlns:r="http://schemas.openxmlformats.org/officeDocument/2006/relationships" xmlns:p="http://schemas.openxmlformats.org/presentationml/2006/main" preserve="1" userDrawn="1">
-  <p:cSld name="Standard">
-    <p:bg>
-      <p:bgPr>
-        <a:gradFill rotWithShape="0">
-          <a:gsLst>
-            <a:gs pos="0">
-              <a:schemeClr val="bg1"/>
-            </a:gs>
-            <a:gs pos="100000">
-              <a:schemeClr val="bg2"/>
-            </a:gs>
-          </a:gsLst>
-          <a:lin ang="5400000" scaled="1"/>
-        </a:gradFill>
-        <a:effectLst/>
-      </p:bgPr>
-    </p:bg>
-    <p:spTree>
-      <p:nvGrpSpPr>
-        <p:cNvPr id="1" name=""/>
-        <p:cNvGrpSpPr/>
-        <p:nvPr/>
-      </p:nvGrpSpPr>
-      <p:grpSpPr>
-        <a:xfrm>
-          <a:off x="0" y="0"/>
-          <a:ext cx="0" cy="0"/>
-          <a:chOff x="0" y="0"/>
-          <a:chExt cx="0" cy="0"/>
-        </a:xfrm>
-      </p:grpSpPr>
-      <p:sp>
-        <p:nvSpPr>
-          <p:cNvPr id="13" name="Title 12"/>
-          <p:cNvSpPr>
-            <a:spLocks noGrp="1"/>
-          </p:cNvSpPr>
-          <p:nvPr>
-            <p:ph type="title"/>
-          </p:nvPr>
-        </p:nvSpPr>
-        <p:spPr/>
-        <p:txBody>
-          <a:bodyPr/>
-          <a:lstStyle/>
-          <a:p>
-            <a:r>
-              <a:rPr lang="en-US" smtClean="0"/>
-              <a:t>Click to edit Master title style</a:t>
-            </a:r>
-            <a:endParaRPr lang="en-US" dirty="0"/>
-          </a:p>
-        </p:txBody>
-      </p:sp>
-      <p:sp>
-        <p:nvSpPr>
-          <p:cNvPr id="17" name="Text Placeholder 4"/>
-          <p:cNvSpPr>
-            <a:spLocks noGrp="1"/>
-          </p:cNvSpPr>
-          <p:nvPr>
-            <p:ph type="body" sz="quarter" idx="12"/>
-          </p:nvPr>
-        </p:nvSpPr>
-        <p:spPr>
-          <a:xfrm>
-            <a:off x="650040" y="1856198"/>
-            <a:ext cx="14898624" cy="5345953"/>
-          </a:xfrm>
-        </p:spPr>
-        <p:txBody>
-          <a:bodyPr>
-            <a:noAutofit/>
-          </a:bodyPr>
-          <a:lstStyle>
-            <a:lvl1pPr>
-              <a:spcAft>
-                <a:spcPts val="800"/>
-              </a:spcAft>
-              <a:defRPr baseline="0">
-                <a:solidFill>
-                  <a:schemeClr val="accent3">
-                    <a:lumMod val="50000"/>
-                  </a:schemeClr>
-                </a:solidFill>
-              </a:defRPr>
-            </a:lvl1pPr>
-            <a:lvl2pPr>
-              <a:spcAft>
-                <a:spcPts val="800"/>
-              </a:spcAft>
-              <a:defRPr baseline="0">
-                <a:solidFill>
-                  <a:schemeClr val="accent3">
-                    <a:lumMod val="50000"/>
-                  </a:schemeClr>
-                </a:solidFill>
-              </a:defRPr>
-            </a:lvl2pPr>
-            <a:lvl3pPr>
-              <a:spcAft>
-                <a:spcPts val="800"/>
-              </a:spcAft>
-              <a:defRPr baseline="0">
-                <a:solidFill>
-                  <a:schemeClr val="accent3">
-                    <a:lumMod val="50000"/>
-                  </a:schemeClr>
-                </a:solidFill>
-              </a:defRPr>
-            </a:lvl3pPr>
-            <a:lvl4pPr>
-              <a:spcAft>
-                <a:spcPts val="800"/>
-              </a:spcAft>
-              <a:defRPr baseline="0">
-                <a:solidFill>
-                  <a:schemeClr val="accent3">
-                    <a:lumMod val="50000"/>
-                  </a:schemeClr>
-                </a:solidFill>
-              </a:defRPr>
-            </a:lvl4pPr>
-            <a:lvl5pPr>
-              <a:spcAft>
-                <a:spcPts val="800"/>
-              </a:spcAft>
-              <a:defRPr baseline="0">
-                <a:solidFill>
-                  <a:schemeClr val="accent3">
-                    <a:lumMod val="50000"/>
-                  </a:schemeClr>
-                </a:solidFill>
-              </a:defRPr>
-            </a:lvl5pPr>
-          </a:lstStyle>
-          <a:p>
-            <a:pPr lvl="0"/>
-            <a:r>
-              <a:rPr lang="en-US" smtClean="0"/>
-              <a:t>Click to edit Master text styles</a:t>
-            </a:r>
-          </a:p>
-          <a:p>
-            <a:pPr lvl="1"/>
-            <a:r>
-              <a:rPr lang="en-US" smtClean="0"/>
-              <a:t>Second level</a:t>
-            </a:r>
-          </a:p>
-          <a:p>
-            <a:pPr lvl="2"/>
-            <a:r>
-              <a:rPr lang="en-US" smtClean="0"/>
-              <a:t>Third level</a:t>
-            </a:r>
-          </a:p>
-        </p:txBody>
-      </p:sp>
-    </p:spTree>
-    <p:extLst>
-      <p:ext uri="{BB962C8B-B14F-4D97-AF65-F5344CB8AC3E}">
-        <p14:creationId xmlns:p14="http://schemas.microsoft.com/office/powerpoint/2010/main" val="2747942789"/>
-      </p:ext>
-    </p:extLst>
-  </p:cSld>
-  <p:clrMapOvr>
-    <a:masterClrMapping/>
-  </p:clrMapOvr>
-  <p:transition spd="med">
-    <p:fade/>
-  </p:transition>
-</p:sldLayout>
-</file>
-
-<file path=ppt/slideLayouts/slideLayout20.xml><?xml version="1.0" encoding="utf-8"?>
+<file path=ppt/slideLayouts/slideLayout21.xml><?xml version="1.0" encoding="utf-8"?>
 <p:sldLayout xmlns:a="http://schemas.openxmlformats.org/drawingml/2006/main" xmlns:r="http://schemas.openxmlformats.org/officeDocument/2006/relationships" xmlns:p="http://schemas.openxmlformats.org/presentationml/2006/main" preserve="1" userDrawn="1">
   <p:cSld name="Version Control">
     <p:spTree>
@@ -5096,7 +5384,7 @@
 </p:sldLayout>
 </file>
 
-<file path=ppt/slideLayouts/slideLayout21.xml><?xml version="1.0" encoding="utf-8"?>
+<file path=ppt/slideLayouts/slideLayout22.xml><?xml version="1.0" encoding="utf-8"?>
 <p:sldLayout xmlns:a="http://schemas.openxmlformats.org/drawingml/2006/main" xmlns:r="http://schemas.openxmlformats.org/officeDocument/2006/relationships" xmlns:p="http://schemas.openxmlformats.org/presentationml/2006/main" preserve="1" userDrawn="1">
   <p:cSld name="Discussion">
     <p:spTree>
@@ -5400,7 +5688,7 @@
 </p:sldLayout>
 </file>
 
-<file path=ppt/slideLayouts/slideLayout22.xml><?xml version="1.0" encoding="utf-8"?>
+<file path=ppt/slideLayouts/slideLayout23.xml><?xml version="1.0" encoding="utf-8"?>
 <p:sldLayout xmlns:a="http://schemas.openxmlformats.org/drawingml/2006/main" xmlns:r="http://schemas.openxmlformats.org/officeDocument/2006/relationships" xmlns:p="http://schemas.openxmlformats.org/presentationml/2006/main" userDrawn="1">
   <p:cSld name="File">
     <p:bg>
@@ -5763,7 +6051,7 @@
 </p:sldLayout>
 </file>
 
-<file path=ppt/slideLayouts/slideLayout23.xml><?xml version="1.0" encoding="utf-8"?>
+<file path=ppt/slideLayouts/slideLayout24.xml><?xml version="1.0" encoding="utf-8"?>
 <p:sldLayout xmlns:a="http://schemas.openxmlformats.org/drawingml/2006/main" xmlns:r="http://schemas.openxmlformats.org/officeDocument/2006/relationships" xmlns:p="http://schemas.openxmlformats.org/presentationml/2006/main" userDrawn="1">
   <p:cSld name="Command - Black">
     <p:bg>
@@ -8156,7 +8444,7 @@
           <p:nvPr/>
         </p:nvPicPr>
         <p:blipFill>
-          <a:blip r:embed="rId15">
+          <a:blip r:embed="rId16">
             <a:extLst>
               <a:ext uri="{28A0092B-C50C-407E-A947-70E740481C1C}">
                 <a14:useLocalDpi xmlns:a14="http://schemas.microsoft.com/office/drawing/2010/main" val="0"/>
@@ -8428,6 +8716,7 @@
     <p:sldLayoutId id="2147483841" r:id="rId11"/>
     <p:sldLayoutId id="2147483843" r:id="rId12"/>
     <p:sldLayoutId id="2147483867" r:id="rId13"/>
+    <p:sldLayoutId id="2147483870" r:id="rId14"/>
   </p:sldLayoutIdLst>
   <p:transition spd="med">
     <p:fade/>
@@ -9829,7 +10118,11 @@
           <a:p>
             <a:r>
               <a:rPr lang="en-US" dirty="0" smtClean="0"/>
-              <a:t>Review the Existing Unit Tests</a:t>
+              <a:t>Reviewing </a:t>
+            </a:r>
+            <a:r>
+              <a:rPr lang="en-US" dirty="0" smtClean="0"/>
+              <a:t>the Existing Unit Tests</a:t>
             </a:r>
             <a:endParaRPr lang="en-US" dirty="0"/>
           </a:p>
@@ -10470,7 +10763,11 @@
           <a:p>
             <a:r>
               <a:rPr lang="en-US" dirty="0" smtClean="0"/>
-              <a:t>Execute the Existing Unit Tests</a:t>
+              <a:t>Executing </a:t>
+            </a:r>
+            <a:r>
+              <a:rPr lang="en-US" dirty="0" smtClean="0"/>
+              <a:t>the Existing Unit Tests</a:t>
             </a:r>
             <a:endParaRPr lang="en-US" dirty="0"/>
           </a:p>
@@ -10524,7 +10821,11 @@
           <a:bodyPr/>
           <a:lstStyle/>
           <a:p>
-            <a:endParaRPr lang="en-US"/>
+            <a:r>
+              <a:rPr lang="en-US" dirty="0" smtClean="0"/>
+              <a:t>Reviewing the Default Recipe</a:t>
+            </a:r>
+            <a:endParaRPr lang="en-US" dirty="0"/>
           </a:p>
         </p:txBody>
       </p:sp>
@@ -10780,7 +11081,11 @@
           <a:bodyPr/>
           <a:lstStyle/>
           <a:p>
-            <a:endParaRPr lang="en-US"/>
+            <a:r>
+              <a:rPr lang="en-US" dirty="0" smtClean="0"/>
+              <a:t>Reviewing the Default Recipe</a:t>
+            </a:r>
+            <a:endParaRPr lang="en-US" dirty="0"/>
           </a:p>
         </p:txBody>
       </p:sp>
@@ -11043,7 +11348,11 @@
           <a:bodyPr/>
           <a:lstStyle/>
           <a:p>
-            <a:endParaRPr lang="en-US"/>
+            <a:r>
+              <a:rPr lang="en-US" dirty="0" smtClean="0"/>
+              <a:t>Reviewing the Default Recipe</a:t>
+            </a:r>
+            <a:endParaRPr lang="en-US" dirty="0"/>
           </a:p>
         </p:txBody>
       </p:sp>
@@ -11472,7 +11781,11 @@
           <a:bodyPr/>
           <a:lstStyle/>
           <a:p>
-            <a:endParaRPr lang="en-US"/>
+            <a:r>
+              <a:rPr lang="en-US" dirty="0" smtClean="0"/>
+              <a:t>Reviewing the Default Recipe</a:t>
+            </a:r>
+            <a:endParaRPr lang="en-US" dirty="0"/>
           </a:p>
         </p:txBody>
       </p:sp>
@@ -12155,7 +12468,11 @@
           <a:bodyPr/>
           <a:lstStyle/>
           <a:p>
-            <a:endParaRPr lang="en-US"/>
+            <a:r>
+              <a:rPr lang="en-US" dirty="0" smtClean="0"/>
+              <a:t>Generating a Custom Resource</a:t>
+            </a:r>
+            <a:endParaRPr lang="en-US" dirty="0"/>
           </a:p>
         </p:txBody>
       </p:sp>
@@ -12397,7 +12714,11 @@
           <a:bodyPr/>
           <a:lstStyle/>
           <a:p>
-            <a:endParaRPr lang="en-US"/>
+            <a:r>
+              <a:rPr lang="en-US" dirty="0" smtClean="0"/>
+              <a:t>Removing an un-needed Directory</a:t>
+            </a:r>
+            <a:endParaRPr lang="en-US" dirty="0"/>
           </a:p>
         </p:txBody>
       </p:sp>
@@ -12449,7 +12770,11 @@
           <a:bodyPr/>
           <a:lstStyle/>
           <a:p>
-            <a:endParaRPr lang="en-US"/>
+            <a:r>
+              <a:rPr lang="en-US" dirty="0" smtClean="0"/>
+              <a:t>Defining the Create Action</a:t>
+            </a:r>
+            <a:endParaRPr lang="en-US" dirty="0"/>
           </a:p>
         </p:txBody>
       </p:sp>
@@ -12584,7 +12909,11 @@
           <a:bodyPr/>
           <a:lstStyle/>
           <a:p>
-            <a:endParaRPr lang="en-US"/>
+            <a:r>
+              <a:rPr lang="en-US" dirty="0" smtClean="0"/>
+              <a:t>Implementing the Create Action</a:t>
+            </a:r>
+            <a:endParaRPr lang="en-US" dirty="0"/>
           </a:p>
         </p:txBody>
       </p:sp>
@@ -13029,7 +13358,11 @@
           <a:bodyPr/>
           <a:lstStyle/>
           <a:p>
-            <a:endParaRPr lang="en-US"/>
+            <a:r>
+              <a:rPr lang="en-US" dirty="0" smtClean="0"/>
+              <a:t>Refactoring the Default Recipe</a:t>
+            </a:r>
+            <a:endParaRPr lang="en-US" dirty="0"/>
           </a:p>
         </p:txBody>
       </p:sp>
@@ -13397,7 +13730,11 @@
           <a:bodyPr/>
           <a:lstStyle/>
           <a:p>
-            <a:endParaRPr lang="en-US"/>
+            <a:r>
+              <a:rPr lang="en-US" dirty="0" smtClean="0"/>
+              <a:t>Refactoring the Default Recipe</a:t>
+            </a:r>
+            <a:endParaRPr lang="en-US" dirty="0"/>
           </a:p>
         </p:txBody>
       </p:sp>
@@ -13812,7 +14149,11 @@
           <a:bodyPr/>
           <a:lstStyle/>
           <a:p>
-            <a:endParaRPr lang="en-US"/>
+            <a:r>
+              <a:rPr lang="en-US" dirty="0" smtClean="0"/>
+              <a:t>Adding the New Custom Resource</a:t>
+            </a:r>
+            <a:endParaRPr lang="en-US" dirty="0"/>
           </a:p>
         </p:txBody>
       </p:sp>
@@ -14240,7 +14581,11 @@
           <a:bodyPr/>
           <a:lstStyle/>
           <a:p>
-            <a:endParaRPr lang="en-US"/>
+            <a:r>
+              <a:rPr lang="en-US" dirty="0" smtClean="0"/>
+              <a:t>Executing the Unit Tests</a:t>
+            </a:r>
+            <a:endParaRPr lang="en-US" dirty="0"/>
           </a:p>
         </p:txBody>
       </p:sp>
@@ -14289,10 +14634,16 @@
         </p:nvSpPr>
         <p:spPr/>
         <p:txBody>
-          <a:bodyPr/>
+          <a:bodyPr>
+            <a:normAutofit/>
+          </a:bodyPr>
           <a:lstStyle/>
           <a:p>
-            <a:endParaRPr lang="en-US"/>
+            <a:r>
+              <a:rPr lang="en-US" sz="4800" dirty="0" smtClean="0"/>
+              <a:t>Updating the Unit Tests to Verify Custom Resource</a:t>
+            </a:r>
+            <a:endParaRPr lang="en-US" sz="4800" dirty="0"/>
           </a:p>
         </p:txBody>
       </p:sp>
@@ -14669,7 +15020,15 @@
           <a:bodyPr/>
           <a:lstStyle/>
           <a:p>
-            <a:endParaRPr lang="en-US"/>
+            <a:r>
+              <a:rPr lang="en-US" dirty="0" err="1" smtClean="0"/>
+              <a:t>Exexucting</a:t>
+            </a:r>
+            <a:r>
+              <a:rPr lang="en-US" dirty="0" smtClean="0"/>
+              <a:t> the Unit Tests</a:t>
+            </a:r>
+            <a:endParaRPr lang="en-US" dirty="0"/>
           </a:p>
         </p:txBody>
       </p:sp>
@@ -14981,7 +15340,11 @@
           <a:bodyPr/>
           <a:lstStyle/>
           <a:p>
-            <a:endParaRPr lang="en-US"/>
+            <a:r>
+              <a:rPr lang="en-US" dirty="0" smtClean="0"/>
+              <a:t>Converging the Test Instance</a:t>
+            </a:r>
+            <a:endParaRPr lang="en-US" dirty="0"/>
           </a:p>
         </p:txBody>
       </p:sp>
@@ -15185,10 +15548,16 @@
         </p:nvSpPr>
         <p:spPr/>
         <p:txBody>
-          <a:bodyPr/>
+          <a:bodyPr>
+            <a:noAutofit/>
+          </a:bodyPr>
           <a:lstStyle/>
           <a:p>
-            <a:endParaRPr lang="en-US"/>
+            <a:r>
+              <a:rPr lang="en-US" sz="4400" dirty="0" smtClean="0"/>
+              <a:t>Removing the Notification from Action Implementation</a:t>
+            </a:r>
+            <a:endParaRPr lang="en-US" sz="4400" dirty="0"/>
           </a:p>
         </p:txBody>
       </p:sp>
@@ -15640,7 +16009,11 @@
           <a:bodyPr/>
           <a:lstStyle/>
           <a:p>
-            <a:endParaRPr lang="en-US"/>
+            <a:r>
+              <a:rPr lang="en-US" dirty="0" smtClean="0"/>
+              <a:t>Adding the Notification to the Resource</a:t>
+            </a:r>
+            <a:endParaRPr lang="en-US" dirty="0"/>
           </a:p>
         </p:txBody>
       </p:sp>
@@ -16152,7 +16525,11 @@
           <a:bodyPr/>
           <a:lstStyle/>
           <a:p>
-            <a:endParaRPr lang="en-US"/>
+            <a:r>
+              <a:rPr lang="en-US" dirty="0" smtClean="0"/>
+              <a:t>Converging the Test Instance</a:t>
+            </a:r>
+            <a:endParaRPr lang="en-US" dirty="0"/>
           </a:p>
         </p:txBody>
       </p:sp>
@@ -16483,7 +16860,11 @@
           <a:bodyPr/>
           <a:lstStyle/>
           <a:p>
-            <a:endParaRPr lang="en-US"/>
+            <a:r>
+              <a:rPr lang="en-US" dirty="0" smtClean="0"/>
+              <a:t>Verifying the Test Instance</a:t>
+            </a:r>
+            <a:endParaRPr lang="en-US" dirty="0"/>
           </a:p>
         </p:txBody>
       </p:sp>
@@ -16662,10 +17043,20 @@
         </p:nvSpPr>
         <p:spPr/>
         <p:txBody>
-          <a:bodyPr/>
+          <a:bodyPr>
+            <a:normAutofit fontScale="90000"/>
+          </a:bodyPr>
           <a:lstStyle/>
           <a:p>
-            <a:endParaRPr lang="en-US"/>
+            <a:r>
+              <a:rPr lang="en-US" dirty="0" smtClean="0"/>
+              <a:t>Defining a Property to Manage the </a:t>
+            </a:r>
+            <a:r>
+              <a:rPr lang="en-US" dirty="0" err="1" smtClean="0"/>
+              <a:t>site_name</a:t>
+            </a:r>
+            <a:endParaRPr lang="en-US" dirty="0"/>
           </a:p>
         </p:txBody>
       </p:sp>
@@ -17071,7 +17462,11 @@
           <a:bodyPr/>
           <a:lstStyle/>
           <a:p>
-            <a:endParaRPr lang="en-US"/>
+            <a:r>
+              <a:rPr lang="en-US" dirty="0" smtClean="0"/>
+              <a:t>Updating the Action to use the Property</a:t>
+            </a:r>
+            <a:endParaRPr lang="en-US" dirty="0"/>
           </a:p>
         </p:txBody>
       </p:sp>
@@ -17736,10 +18131,16 @@
         </p:nvSpPr>
         <p:spPr/>
         <p:txBody>
-          <a:bodyPr/>
+          <a:bodyPr>
+            <a:normAutofit fontScale="90000"/>
+          </a:bodyPr>
           <a:lstStyle/>
           <a:p>
-            <a:endParaRPr lang="en-US"/>
+            <a:r>
+              <a:rPr lang="en-US" dirty="0" smtClean="0"/>
+              <a:t>Updating the Resource to use the Property</a:t>
+            </a:r>
+            <a:endParaRPr lang="en-US" dirty="0"/>
           </a:p>
         </p:txBody>
       </p:sp>
@@ -18106,7 +18507,11 @@
           <a:bodyPr/>
           <a:lstStyle/>
           <a:p>
-            <a:endParaRPr lang="en-US"/>
+            <a:r>
+              <a:rPr lang="en-US" dirty="0" smtClean="0"/>
+              <a:t>Executing the Unit Tests</a:t>
+            </a:r>
+            <a:endParaRPr lang="en-US" dirty="0"/>
           </a:p>
         </p:txBody>
       </p:sp>
@@ -18441,10 +18846,16 @@
         </p:nvSpPr>
         <p:spPr/>
         <p:txBody>
-          <a:bodyPr/>
+          <a:bodyPr>
+            <a:normAutofit fontScale="90000"/>
+          </a:bodyPr>
           <a:lstStyle/>
           <a:p>
-            <a:endParaRPr lang="en-US"/>
+            <a:r>
+              <a:rPr lang="en-US" dirty="0" smtClean="0"/>
+              <a:t>Converging and Verifying the Test Instance</a:t>
+            </a:r>
+            <a:endParaRPr lang="en-US" dirty="0"/>
           </a:p>
         </p:txBody>
       </p:sp>
@@ -18498,7 +18909,11 @@
           <a:p>
             <a:r>
               <a:rPr lang="en-US" dirty="0" smtClean="0"/>
-              <a:t>Review the Existing Integration Tests</a:t>
+              <a:t>Reviewing </a:t>
+            </a:r>
+            <a:r>
+              <a:rPr lang="en-US" dirty="0" smtClean="0"/>
+              <a:t>the Existing Integration Tests</a:t>
             </a:r>
             <a:endParaRPr lang="en-US" dirty="0"/>
           </a:p>
@@ -18995,10 +19410,20 @@
         </p:nvSpPr>
         <p:spPr/>
         <p:txBody>
-          <a:bodyPr/>
+          <a:bodyPr>
+            <a:normAutofit fontScale="90000"/>
+          </a:bodyPr>
           <a:lstStyle/>
           <a:p>
-            <a:endParaRPr lang="en-US"/>
+            <a:r>
+              <a:rPr lang="en-US" dirty="0" smtClean="0"/>
+              <a:t>Defining a Property to Manage the </a:t>
+            </a:r>
+            <a:r>
+              <a:rPr lang="en-US" dirty="0" err="1" smtClean="0"/>
+              <a:t>site_port</a:t>
+            </a:r>
+            <a:endParaRPr lang="en-US" dirty="0"/>
           </a:p>
         </p:txBody>
       </p:sp>
@@ -19477,10 +19902,20 @@
         </p:nvSpPr>
         <p:spPr/>
         <p:txBody>
-          <a:bodyPr/>
+          <a:bodyPr>
+            <a:normAutofit fontScale="90000"/>
+          </a:bodyPr>
           <a:lstStyle/>
           <a:p>
-            <a:endParaRPr lang="en-US"/>
+            <a:r>
+              <a:rPr lang="en-US" dirty="0" smtClean="0"/>
+              <a:t>Updating the Resourc</a:t>
+            </a:r>
+            <a:r>
+              <a:rPr lang="en-US" dirty="0" smtClean="0"/>
+              <a:t>e to use the Property</a:t>
+            </a:r>
+            <a:endParaRPr lang="en-US" dirty="0"/>
           </a:p>
         </p:txBody>
       </p:sp>
@@ -19946,7 +20381,7 @@
           <a:p>
             <a:pPr>
               <a:lnSpc>
-                <a:spcPct val="120000"/>
+                <a:spcPct val="150000"/>
               </a:lnSpc>
             </a:pPr>
             <a:r>
@@ -19965,11 +20400,11 @@
           <a:p>
             <a:pPr lvl="1" algn="l">
               <a:lnSpc>
-                <a:spcPct val="120000"/>
-              </a:lnSpc>
-            </a:pPr>
-            <a:r>
-              <a:rPr lang="en-US" sz="2400" dirty="0" smtClean="0">
+                <a:spcPct val="150000"/>
+              </a:lnSpc>
+            </a:pPr>
+            <a:r>
+              <a:rPr lang="en-US" sz="2400" i="1" dirty="0" smtClean="0">
                 <a:solidFill>
                   <a:schemeClr val="tx1"/>
                 </a:solidFill>
@@ -19980,71 +20415,84 @@
           <a:p>
             <a:pPr lvl="1" algn="l">
               <a:lnSpc>
-                <a:spcPct val="120000"/>
-              </a:lnSpc>
-            </a:pPr>
-            <a:r>
-              <a:rPr lang="en-US" sz="2400" dirty="0" smtClean="0">
+                <a:spcPct val="150000"/>
+              </a:lnSpc>
+            </a:pPr>
+            <a:r>
+              <a:rPr lang="en-US" sz="2400" i="1" dirty="0" smtClean="0">
                 <a:solidFill>
                   <a:schemeClr val="tx1"/>
                 </a:solidFill>
               </a:rPr>
               <a:t>Removes the configuration file</a:t>
             </a:r>
-          </a:p>
-          <a:p>
-            <a:pPr lvl="1" algn="l">
-              <a:lnSpc>
-                <a:spcPct val="120000"/>
-              </a:lnSpc>
-            </a:pPr>
-            <a:r>
-              <a:rPr lang="en-US" sz="2400" dirty="0" smtClean="0">
+            <a:endParaRPr lang="en-US" i="1" dirty="0" smtClean="0"/>
+          </a:p>
+          <a:p>
+            <a:pPr>
+              <a:lnSpc>
+                <a:spcPct val="150000"/>
+              </a:lnSpc>
+            </a:pPr>
+            <a:r>
+              <a:rPr lang="en-US" dirty="0" smtClean="0"/>
+              <a:t>Remove the default site by removing the 'welcome' apache </a:t>
+            </a:r>
+            <a:r>
+              <a:rPr lang="en-US" dirty="0" err="1" smtClean="0"/>
+              <a:t>vhost</a:t>
+            </a:r>
+            <a:endParaRPr lang="en-US" dirty="0" smtClean="0"/>
+          </a:p>
+          <a:p>
+            <a:pPr marL="609559" lvl="2" algn="l">
+              <a:lnSpc>
+                <a:spcPct val="150000"/>
+              </a:lnSpc>
+              <a:spcBef>
+                <a:spcPts val="0"/>
+              </a:spcBef>
+            </a:pPr>
+            <a:r>
+              <a:rPr lang="en-US" i="1" dirty="0" smtClean="0">
                 <a:solidFill>
                   <a:schemeClr val="tx1"/>
                 </a:solidFill>
               </a:rPr>
-              <a:t>Ensure if this resource takes action it will restart the Apache service</a:t>
-            </a:r>
-          </a:p>
-          <a:p>
-            <a:pPr>
-              <a:lnSpc>
-                <a:spcPct val="120000"/>
-              </a:lnSpc>
-            </a:pPr>
-            <a:endParaRPr lang="en-US" dirty="0" smtClean="0"/>
-          </a:p>
-          <a:p>
-            <a:pPr>
-              <a:lnSpc>
-                <a:spcPct val="120000"/>
-              </a:lnSpc>
-            </a:pPr>
-            <a:r>
-              <a:rPr lang="en-US" dirty="0" smtClean="0"/>
-              <a:t>Remove the default site by removing the 'welcome' apache </a:t>
+              <a:t>Ensure </a:t>
+            </a:r>
+            <a:r>
+              <a:rPr lang="en-US" i="1" dirty="0">
+                <a:solidFill>
+                  <a:schemeClr val="tx1"/>
+                </a:solidFill>
+              </a:rPr>
+              <a:t>if this resource takes action it will restart the Apache </a:t>
+            </a:r>
+            <a:r>
+              <a:rPr lang="en-US" i="1" dirty="0" smtClean="0">
+                <a:solidFill>
+                  <a:schemeClr val="tx1"/>
+                </a:solidFill>
+              </a:rPr>
+              <a:t>service</a:t>
+            </a:r>
+            <a:endParaRPr lang="en-US" i="1" dirty="0" smtClean="0"/>
+          </a:p>
+          <a:p>
+            <a:pPr>
+              <a:lnSpc>
+                <a:spcPct val="150000"/>
+              </a:lnSpc>
+            </a:pPr>
+            <a:r>
+              <a:rPr lang="en-US" dirty="0" smtClean="0"/>
+              <a:t>Add a 'users' apache </a:t>
             </a:r>
             <a:r>
               <a:rPr lang="en-US" dirty="0" err="1" smtClean="0"/>
               <a:t>vhost</a:t>
             </a:r>
-            <a:endParaRPr lang="en-US" dirty="0" smtClean="0"/>
-          </a:p>
-          <a:p>
-            <a:pPr>
-              <a:lnSpc>
-                <a:spcPct val="120000"/>
-              </a:lnSpc>
-            </a:pPr>
-            <a:r>
-              <a:rPr lang="en-US" dirty="0" smtClean="0"/>
-              <a:t>Add a 'users' apache </a:t>
-            </a:r>
-            <a:r>
-              <a:rPr lang="en-US" dirty="0" err="1" smtClean="0"/>
-              <a:t>vhost</a:t>
-            </a:r>
             <a:r>
               <a:rPr lang="en-US" dirty="0" smtClean="0"/>
               <a:t> that is available on port 80</a:t>
@@ -20053,12 +20501,20 @@
           <a:p>
             <a:pPr>
               <a:lnSpc>
-                <a:spcPct val="120000"/>
+                <a:spcPct val="150000"/>
               </a:lnSpc>
             </a:pPr>
             <a:r>
               <a:rPr lang="en-US" dirty="0"/>
-              <a:t>Update the unit tests and integration tests to set expect the default site to "</a:t>
+              <a:t>Update the </a:t>
+            </a:r>
+            <a:r>
+              <a:rPr lang="en-US" dirty="0" smtClean="0"/>
+              <a:t>tests </a:t>
+            </a:r>
+            <a:r>
+              <a:rPr lang="en-US" dirty="0"/>
+              <a:t>to set expect the default site to "</a:t>
             </a:r>
             <a:r>
               <a:rPr lang="en-US" dirty="0" smtClean="0"/>
@@ -20116,7 +20572,15 @@
           <a:bodyPr/>
           <a:lstStyle/>
           <a:p>
-            <a:endParaRPr lang="en-US"/>
+            <a:r>
+              <a:rPr lang="en-US" dirty="0" smtClean="0"/>
+              <a:t>Defining th</a:t>
+            </a:r>
+            <a:r>
+              <a:rPr lang="en-US" dirty="0" smtClean="0"/>
+              <a:t>e Resource's Remove Action</a:t>
+            </a:r>
+            <a:endParaRPr lang="en-US" dirty="0"/>
           </a:p>
         </p:txBody>
       </p:sp>
@@ -20371,7 +20835,11 @@
           <a:bodyPr/>
           <a:lstStyle/>
           <a:p>
-            <a:endParaRPr lang="en-US"/>
+            <a:r>
+              <a:rPr lang="en-US" dirty="0" smtClean="0"/>
+              <a:t>Removing the Resource from the Recipe</a:t>
+            </a:r>
+            <a:endParaRPr lang="en-US" dirty="0"/>
           </a:p>
         </p:txBody>
       </p:sp>
@@ -20721,10 +21189,16 @@
         </p:nvSpPr>
         <p:spPr/>
         <p:txBody>
-          <a:bodyPr/>
+          <a:bodyPr>
+            <a:noAutofit/>
+          </a:bodyPr>
           <a:lstStyle/>
           <a:p>
-            <a:endParaRPr lang="en-US"/>
+            <a:r>
+              <a:rPr lang="en-US" sz="4400" dirty="0" smtClean="0"/>
+              <a:t>Adding the Resource with Remove Action to the Recipe</a:t>
+            </a:r>
+            <a:endParaRPr lang="en-US" sz="4400" dirty="0"/>
           </a:p>
         </p:txBody>
       </p:sp>
@@ -21077,10 +21551,16 @@
         </p:nvSpPr>
         <p:spPr/>
         <p:txBody>
-          <a:bodyPr/>
+          <a:bodyPr>
+            <a:normAutofit fontScale="90000"/>
+          </a:bodyPr>
           <a:lstStyle/>
           <a:p>
-            <a:endParaRPr lang="en-US"/>
+            <a:r>
+              <a:rPr lang="en-US" dirty="0" smtClean="0"/>
+              <a:t>Adding the Resource to create the users site</a:t>
+            </a:r>
+            <a:endParaRPr lang="en-US" dirty="0"/>
           </a:p>
         </p:txBody>
       </p:sp>
@@ -21162,11 +21642,7 @@
             </a:r>
             <a:r>
               <a:rPr lang="en-US" dirty="0" smtClean="0"/>
-              <a:t> 'users' </a:t>
-            </a:r>
-            <a:r>
-              <a:rPr lang="en-US" dirty="0" smtClean="0"/>
-              <a:t>do</a:t>
+              <a:t> 'users' do</a:t>
             </a:r>
           </a:p>
           <a:p>
@@ -21186,7 +21662,6 @@
               <a:rPr lang="en-US" dirty="0" smtClean="0"/>
               <a:t> 80</a:t>
             </a:r>
-            <a:endParaRPr lang="en-US" dirty="0" smtClean="0"/>
           </a:p>
           <a:p>
             <a:r>
@@ -21205,7 +21680,6 @@
               <a:rPr lang="en-US" dirty="0" smtClean="0"/>
               <a:t>]'</a:t>
             </a:r>
-            <a:endParaRPr lang="en-US" dirty="0" smtClean="0"/>
           </a:p>
           <a:p>
             <a:r>
@@ -21525,7 +21999,11 @@
           <a:p>
             <a:r>
               <a:rPr lang="en-US" dirty="0" smtClean="0"/>
-              <a:t>Execute the Existing Integration Tests</a:t>
+              <a:t>Executing </a:t>
+            </a:r>
+            <a:r>
+              <a:rPr lang="en-US" dirty="0" smtClean="0"/>
+              <a:t>the Existing Integration Tests</a:t>
             </a:r>
             <a:endParaRPr lang="en-US" dirty="0"/>
           </a:p>
@@ -21583,10 +22061,16 @@
         </p:nvSpPr>
         <p:spPr/>
         <p:txBody>
-          <a:bodyPr/>
+          <a:bodyPr>
+            <a:normAutofit/>
+          </a:bodyPr>
           <a:lstStyle/>
           <a:p>
-            <a:endParaRPr lang="en-US"/>
+            <a:r>
+              <a:rPr lang="en-US" sz="4800" dirty="0" smtClean="0"/>
+              <a:t>Removing the Un-needed Unit Test Expectation </a:t>
+            </a:r>
+            <a:endParaRPr lang="en-US" sz="4800" dirty="0"/>
           </a:p>
         </p:txBody>
       </p:sp>
@@ -21869,7 +22353,7 @@
           <a:p>
             <a:r>
               <a:rPr lang="en-US" dirty="0" smtClean="0"/>
-              <a:t>Review the Existing Unit Tests</a:t>
+              <a:t>Adding Expectations for the users Site</a:t>
             </a:r>
             <a:endParaRPr lang="en-US" dirty="0"/>
           </a:p>
@@ -22251,12 +22735,12 @@
       </p:grpSpPr>
       <p:sp>
         <p:nvSpPr>
-          <p:cNvPr id="2" name="Title 1"/>
-          <p:cNvSpPr>
-            <a:spLocks noGrp="1"/>
-          </p:cNvSpPr>
-          <p:nvPr>
-            <p:ph type="title"/>
+          <p:cNvPr id="2" name="Content Placeholder 1"/>
+          <p:cNvSpPr>
+            <a:spLocks noGrp="1"/>
+          </p:cNvSpPr>
+          <p:nvPr>
+            <p:ph sz="quarter" idx="10"/>
           </p:nvPr>
         </p:nvSpPr>
         <p:spPr/>
@@ -22264,139 +22748,17 @@
           <a:bodyPr/>
           <a:lstStyle/>
           <a:p>
-            <a:endParaRPr lang="en-US"/>
-          </a:p>
-        </p:txBody>
-      </p:sp>
-      <p:sp>
-        <p:nvSpPr>
-          <p:cNvPr id="3" name="Content Placeholder 2"/>
-          <p:cNvSpPr>
-            <a:spLocks noGrp="1"/>
-          </p:cNvSpPr>
-          <p:nvPr>
-            <p:ph sz="quarter" idx="10"/>
-          </p:nvPr>
-        </p:nvSpPr>
-        <p:spPr/>
-        <p:txBody>
-          <a:bodyPr>
-            <a:normAutofit/>
-          </a:bodyPr>
-          <a:lstStyle/>
-          <a:p>
-            <a:r>
-              <a:rPr lang="en-US" sz="2000" dirty="0"/>
-              <a:t>require '</a:t>
-            </a:r>
-            <a:r>
-              <a:rPr lang="en-US" sz="2000" dirty="0" err="1"/>
-              <a:t>spec_helper</a:t>
-            </a:r>
-            <a:r>
-              <a:rPr lang="en-US" sz="2000" dirty="0"/>
-              <a:t>'</a:t>
-            </a:r>
-          </a:p>
-          <a:p>
+            <a:r>
+              <a:rPr lang="en-US" sz="2000" dirty="0" smtClean="0"/>
+              <a:t>.........</a:t>
+            </a:r>
             <a:endParaRPr lang="en-US" sz="2000" dirty="0"/>
           </a:p>
-          <a:p>
-            <a:r>
-              <a:rPr lang="en-US" sz="2000" dirty="0"/>
-              <a:t>describe 'apache::default' do</a:t>
-            </a:r>
-          </a:p>
-          <a:p>
-            <a:r>
-              <a:rPr lang="en-US" sz="2000" dirty="0"/>
-              <a:t>  describe command('curl http://</a:t>
-            </a:r>
-            <a:r>
-              <a:rPr lang="en-US" sz="2000" dirty="0" err="1"/>
-              <a:t>localhost</a:t>
-            </a:r>
-            <a:r>
-              <a:rPr lang="en-US" sz="2000" dirty="0"/>
-              <a:t>') do</a:t>
-            </a:r>
-          </a:p>
-          <a:p>
-            <a:r>
-              <a:rPr lang="en-US" sz="2000" dirty="0"/>
-              <a:t>    its(:</a:t>
-            </a:r>
-            <a:r>
-              <a:rPr lang="en-US" sz="2000" dirty="0" err="1"/>
-              <a:t>stdout</a:t>
-            </a:r>
-            <a:r>
-              <a:rPr lang="en-US" sz="2000" dirty="0"/>
-              <a:t>) { should </a:t>
-            </a:r>
-            <a:r>
-              <a:rPr lang="en-US" sz="2000" dirty="0" smtClean="0"/>
-              <a:t>match(/Welcome users/) </a:t>
-            </a:r>
-            <a:r>
-              <a:rPr lang="en-US" sz="2000" dirty="0"/>
-              <a:t>}</a:t>
-            </a:r>
-          </a:p>
-          <a:p>
-            <a:r>
-              <a:rPr lang="en-US" sz="2000" dirty="0"/>
-              <a:t>  end</a:t>
-            </a:r>
-          </a:p>
-          <a:p>
-            <a:endParaRPr lang="en-US" sz="2000" dirty="0"/>
-          </a:p>
-          <a:p>
-            <a:r>
-              <a:rPr lang="en-US" sz="2000" dirty="0"/>
-              <a:t>  describe command('curl http://localhost:8080') do</a:t>
-            </a:r>
-          </a:p>
-          <a:p>
-            <a:r>
-              <a:rPr lang="en-US" sz="2000" dirty="0"/>
-              <a:t>    its(:</a:t>
-            </a:r>
-            <a:r>
-              <a:rPr lang="en-US" sz="2000" dirty="0" err="1"/>
-              <a:t>stdout</a:t>
-            </a:r>
-            <a:r>
-              <a:rPr lang="en-US" sz="2000" dirty="0"/>
-              <a:t>) { should match</a:t>
-            </a:r>
-            <a:r>
-              <a:rPr lang="en-US" sz="2000" dirty="0" smtClean="0"/>
-              <a:t>(/Welcome admins/) </a:t>
-            </a:r>
-            <a:r>
-              <a:rPr lang="en-US" sz="2000" dirty="0"/>
-              <a:t>}</a:t>
-            </a:r>
-          </a:p>
-          <a:p>
-            <a:r>
-              <a:rPr lang="en-US" sz="2000" dirty="0"/>
-              <a:t>  end</a:t>
-            </a:r>
-          </a:p>
-          <a:p>
-            <a:r>
-              <a:rPr lang="en-US" sz="2000" dirty="0"/>
-              <a:t>end</a:t>
-            </a:r>
-          </a:p>
-        </p:txBody>
-      </p:sp>
-      <p:sp>
-        <p:nvSpPr>
-          <p:cNvPr id="4" name="Text Placeholder 3"/>
+        </p:txBody>
+      </p:sp>
+      <p:sp>
+        <p:nvSpPr>
+          <p:cNvPr id="3" name="Text Placeholder 2"/>
           <p:cNvSpPr>
             <a:spLocks noGrp="1"/>
           </p:cNvSpPr>
@@ -22411,19 +22773,11 @@
           <a:p>
             <a:r>
               <a:rPr lang="en-US" dirty="0" smtClean="0"/>
-              <a:t>~/apache/test/integration/default/</a:t>
+              <a:t>&gt; chef exec </a:t>
             </a:r>
             <a:r>
               <a:rPr lang="en-US" dirty="0" err="1" smtClean="0"/>
-              <a:t>serverspec</a:t>
-            </a:r>
-            <a:r>
-              <a:rPr lang="en-US" dirty="0" smtClean="0"/>
-              <a:t>/</a:t>
-            </a:r>
-            <a:r>
-              <a:rPr lang="en-US" dirty="0" err="1" smtClean="0"/>
-              <a:t>default_spec.rb</a:t>
+              <a:t>rspec</a:t>
             </a:r>
             <a:endParaRPr lang="en-US" dirty="0"/>
           </a:p>
@@ -22431,290 +22785,24 @@
       </p:sp>
       <p:sp>
         <p:nvSpPr>
-          <p:cNvPr id="6" name="Text Placeholder 5"/>
-          <p:cNvSpPr>
-            <a:spLocks noGrp="1"/>
-          </p:cNvSpPr>
-          <p:nvPr>
-            <p:ph type="body" sz="quarter" idx="13"/>
-          </p:nvPr>
-        </p:nvSpPr>
-        <p:spPr>
-          <a:xfrm>
-            <a:off x="1135042" y="3729212"/>
-            <a:ext cx="14404273" cy="486419"/>
-          </a:xfrm>
-        </p:spPr>
+          <p:cNvPr id="6" name="Title 5"/>
+          <p:cNvSpPr>
+            <a:spLocks noGrp="1"/>
+          </p:cNvSpPr>
+          <p:nvPr>
+            <p:ph type="title"/>
+          </p:nvPr>
+        </p:nvSpPr>
+        <p:spPr/>
         <p:txBody>
           <a:bodyPr/>
           <a:lstStyle/>
           <a:p>
+            <a:r>
+              <a:rPr lang="en-US" dirty="0" smtClean="0"/>
+              <a:t>Executing the Unit Test Suite</a:t>
+            </a:r>
             <a:endParaRPr lang="en-US" dirty="0"/>
-          </a:p>
-        </p:txBody>
-      </p:sp>
-    </p:spTree>
-    <p:extLst>
-      <p:ext uri="{BB962C8B-B14F-4D97-AF65-F5344CB8AC3E}">
-        <p14:creationId xmlns:p14="http://schemas.microsoft.com/office/powerpoint/2010/main" val="1838042938"/>
-      </p:ext>
-    </p:extLst>
-  </p:cSld>
-  <p:clrMapOvr>
-    <a:masterClrMapping/>
-  </p:clrMapOvr>
-  <p:transition spd="med">
-    <p:fade/>
-  </p:transition>
-</p:sld>
-</file>
-
-<file path=ppt/slides/slide53.xml><?xml version="1.0" encoding="utf-8"?>
-<p:sld xmlns:a="http://schemas.openxmlformats.org/drawingml/2006/main" xmlns:r="http://schemas.openxmlformats.org/officeDocument/2006/relationships" xmlns:p="http://schemas.openxmlformats.org/presentationml/2006/main">
-  <p:cSld>
-    <p:spTree>
-      <p:nvGrpSpPr>
-        <p:cNvPr id="1" name=""/>
-        <p:cNvGrpSpPr/>
-        <p:nvPr/>
-      </p:nvGrpSpPr>
-      <p:grpSpPr>
-        <a:xfrm>
-          <a:off x="0" y="0"/>
-          <a:ext cx="0" cy="0"/>
-          <a:chOff x="0" y="0"/>
-          <a:chExt cx="0" cy="0"/>
-        </a:xfrm>
-      </p:grpSpPr>
-      <p:sp>
-        <p:nvSpPr>
-          <p:cNvPr id="2" name="Content Placeholder 1"/>
-          <p:cNvSpPr>
-            <a:spLocks noGrp="1"/>
-          </p:cNvSpPr>
-          <p:nvPr>
-            <p:ph sz="quarter" idx="10"/>
-          </p:nvPr>
-        </p:nvSpPr>
-        <p:spPr/>
-        <p:txBody>
-          <a:bodyPr/>
-          <a:lstStyle/>
-          <a:p>
-            <a:r>
-              <a:rPr lang="en-US" sz="2000" dirty="0" smtClean="0"/>
-              <a:t>.....F...</a:t>
-            </a:r>
-            <a:endParaRPr lang="en-US" sz="2000" dirty="0"/>
-          </a:p>
-          <a:p>
-            <a:endParaRPr lang="en-US" sz="2000" dirty="0"/>
-          </a:p>
-          <a:p>
-            <a:r>
-              <a:rPr lang="en-US" sz="2000" dirty="0"/>
-              <a:t>Failures:</a:t>
-            </a:r>
-          </a:p>
-          <a:p>
-            <a:endParaRPr lang="en-US" sz="2000" dirty="0"/>
-          </a:p>
-          <a:p>
-            <a:r>
-              <a:rPr lang="en-US" sz="2000" dirty="0"/>
-              <a:t>  1) apache::default When all attributes are default, on an unspecified platform for the default site writes out a new home page</a:t>
-            </a:r>
-          </a:p>
-          <a:p>
-            <a:r>
-              <a:rPr lang="en-US" sz="2000" dirty="0"/>
-              <a:t>     Failure/Error: expect(</a:t>
-            </a:r>
-            <a:r>
-              <a:rPr lang="en-US" sz="2000" dirty="0" err="1"/>
-              <a:t>chef_run</a:t>
-            </a:r>
-            <a:r>
-              <a:rPr lang="en-US" sz="2000" dirty="0"/>
-              <a:t>).</a:t>
-            </a:r>
-            <a:r>
-              <a:rPr lang="en-US" sz="2000" dirty="0" err="1"/>
-              <a:t>not_to</a:t>
-            </a:r>
-            <a:r>
-              <a:rPr lang="en-US" sz="2000" dirty="0"/>
-              <a:t> </a:t>
-            </a:r>
-            <a:r>
-              <a:rPr lang="en-US" sz="2000" dirty="0" err="1"/>
-              <a:t>render_file</a:t>
-            </a:r>
-            <a:r>
-              <a:rPr lang="en-US" sz="2000" dirty="0"/>
-              <a:t>('/</a:t>
-            </a:r>
-            <a:r>
-              <a:rPr lang="en-US" sz="2000" dirty="0" err="1"/>
-              <a:t>var</a:t>
-            </a:r>
-            <a:r>
-              <a:rPr lang="en-US" sz="2000" dirty="0"/>
-              <a:t>/www/html/</a:t>
-            </a:r>
-            <a:r>
-              <a:rPr lang="en-US" sz="2000" dirty="0" err="1"/>
-              <a:t>index.html</a:t>
-            </a:r>
-            <a:r>
-              <a:rPr lang="en-US" sz="2000" dirty="0"/>
-              <a:t>').</a:t>
-            </a:r>
-            <a:r>
-              <a:rPr lang="en-US" sz="2000" dirty="0" err="1"/>
-              <a:t>with_content</a:t>
-            </a:r>
-            <a:r>
-              <a:rPr lang="en-US" sz="2000" dirty="0"/>
-              <a:t>('&lt;</a:t>
-            </a:r>
-            <a:r>
-              <a:rPr lang="en-US" sz="2000" dirty="0" smtClean="0"/>
-              <a:t>h1&gt;Welcome home!&lt;/</a:t>
-            </a:r>
-            <a:r>
-              <a:rPr lang="en-US" sz="2000" dirty="0"/>
-              <a:t>h1&gt;')</a:t>
-            </a:r>
-          </a:p>
-          <a:p>
-            <a:r>
-              <a:rPr lang="en-US" sz="2000" dirty="0"/>
-              <a:t>       expected file "/</a:t>
-            </a:r>
-            <a:r>
-              <a:rPr lang="en-US" sz="2000" dirty="0" err="1"/>
-              <a:t>var</a:t>
-            </a:r>
-            <a:r>
-              <a:rPr lang="en-US" sz="2000" dirty="0"/>
-              <a:t>/www/html/</a:t>
-            </a:r>
-            <a:r>
-              <a:rPr lang="en-US" sz="2000" dirty="0" err="1"/>
-              <a:t>index.html</a:t>
-            </a:r>
-            <a:r>
-              <a:rPr lang="en-US" sz="2000" dirty="0"/>
-              <a:t>" matching:</a:t>
-            </a:r>
-          </a:p>
-          <a:p>
-            <a:endParaRPr lang="en-US" sz="2000" dirty="0"/>
-          </a:p>
-          <a:p>
-            <a:r>
-              <a:rPr lang="en-US" sz="2000" dirty="0"/>
-              <a:t>       &lt;</a:t>
-            </a:r>
-            <a:r>
-              <a:rPr lang="en-US" sz="2000" dirty="0" smtClean="0"/>
-              <a:t>h1&gt;Welcome home!&lt;/</a:t>
-            </a:r>
-            <a:r>
-              <a:rPr lang="en-US" sz="2000" dirty="0"/>
-              <a:t>h1&gt;</a:t>
-            </a:r>
-          </a:p>
-          <a:p>
-            <a:endParaRPr lang="en-US" sz="2000" dirty="0"/>
-          </a:p>
-          <a:p>
-            <a:r>
-              <a:rPr lang="en-US" sz="2000" dirty="0"/>
-              <a:t>        to not be in Chef run</a:t>
-            </a:r>
-          </a:p>
-          <a:p>
-            <a:r>
-              <a:rPr lang="en-US" sz="2000" dirty="0"/>
-              <a:t>     # ./spec/unit/recipes/default_spec.rb:34:in `block (4 levels) in &lt;top (required)&gt;</a:t>
-            </a:r>
-            <a:r>
-              <a:rPr lang="en-US" sz="2000" dirty="0" smtClean="0"/>
-              <a:t>'</a:t>
-            </a:r>
-            <a:endParaRPr lang="en-US" sz="2000" dirty="0"/>
-          </a:p>
-        </p:txBody>
-      </p:sp>
-      <p:sp>
-        <p:nvSpPr>
-          <p:cNvPr id="3" name="Text Placeholder 2"/>
-          <p:cNvSpPr>
-            <a:spLocks noGrp="1"/>
-          </p:cNvSpPr>
-          <p:nvPr>
-            <p:ph type="body" sz="quarter" idx="11"/>
-          </p:nvPr>
-        </p:nvSpPr>
-        <p:spPr/>
-        <p:txBody>
-          <a:bodyPr/>
-          <a:lstStyle/>
-          <a:p>
-            <a:r>
-              <a:rPr lang="en-US" dirty="0" smtClean="0"/>
-              <a:t>&gt; chef exec </a:t>
-            </a:r>
-            <a:r>
-              <a:rPr lang="en-US" dirty="0" err="1" smtClean="0"/>
-              <a:t>rspec</a:t>
-            </a:r>
-            <a:endParaRPr lang="en-US" dirty="0"/>
-          </a:p>
-        </p:txBody>
-      </p:sp>
-      <p:sp>
-        <p:nvSpPr>
-          <p:cNvPr id="7" name="Content Placeholder 6"/>
-          <p:cNvSpPr>
-            <a:spLocks noGrp="1"/>
-          </p:cNvSpPr>
-          <p:nvPr>
-            <p:ph sz="quarter" idx="12"/>
-          </p:nvPr>
-        </p:nvSpPr>
-        <p:spPr>
-          <a:xfrm>
-            <a:off x="1127883" y="2337513"/>
-            <a:ext cx="14420850" cy="499931"/>
-          </a:xfrm>
-        </p:spPr>
-        <p:txBody>
-          <a:bodyPr/>
-          <a:lstStyle/>
-          <a:p>
-            <a:endParaRPr lang="en-US" dirty="0"/>
-          </a:p>
-        </p:txBody>
-      </p:sp>
-      <p:sp>
-        <p:nvSpPr>
-          <p:cNvPr id="6" name="Title 5"/>
-          <p:cNvSpPr>
-            <a:spLocks noGrp="1"/>
-          </p:cNvSpPr>
-          <p:nvPr>
-            <p:ph type="title"/>
-          </p:nvPr>
-        </p:nvSpPr>
-        <p:spPr/>
-        <p:txBody>
-          <a:bodyPr/>
-          <a:lstStyle/>
-          <a:p>
-            <a:endParaRPr lang="en-US"/>
           </a:p>
         </p:txBody>
       </p:sp>
@@ -22741,6 +22829,253 @@
 </p:sld>
 </file>
 
+<file path=ppt/slides/slide53.xml><?xml version="1.0" encoding="utf-8"?>
+<p:sld xmlns:a="http://schemas.openxmlformats.org/drawingml/2006/main" xmlns:r="http://schemas.openxmlformats.org/officeDocument/2006/relationships" xmlns:p="http://schemas.openxmlformats.org/presentationml/2006/main">
+  <p:cSld>
+    <p:spTree>
+      <p:nvGrpSpPr>
+        <p:cNvPr id="1" name=""/>
+        <p:cNvGrpSpPr/>
+        <p:nvPr/>
+      </p:nvGrpSpPr>
+      <p:grpSpPr>
+        <a:xfrm>
+          <a:off x="0" y="0"/>
+          <a:ext cx="0" cy="0"/>
+          <a:chOff x="0" y="0"/>
+          <a:chExt cx="0" cy="0"/>
+        </a:xfrm>
+      </p:grpSpPr>
+      <p:sp>
+        <p:nvSpPr>
+          <p:cNvPr id="2" name="Title 1"/>
+          <p:cNvSpPr>
+            <a:spLocks noGrp="1"/>
+          </p:cNvSpPr>
+          <p:nvPr>
+            <p:ph type="title"/>
+          </p:nvPr>
+        </p:nvSpPr>
+        <p:spPr/>
+        <p:txBody>
+          <a:bodyPr>
+            <a:normAutofit fontScale="90000"/>
+          </a:bodyPr>
+          <a:lstStyle/>
+          <a:p>
+            <a:r>
+              <a:rPr lang="en-US" dirty="0" smtClean="0"/>
+              <a:t>Updating the Expectation for the users </a:t>
+            </a:r>
+            <a:r>
+              <a:rPr lang="en-US" dirty="0" err="1" smtClean="0"/>
+              <a:t>Siste</a:t>
+            </a:r>
+            <a:endParaRPr lang="en-US" dirty="0"/>
+          </a:p>
+        </p:txBody>
+      </p:sp>
+      <p:sp>
+        <p:nvSpPr>
+          <p:cNvPr id="3" name="Content Placeholder 2"/>
+          <p:cNvSpPr>
+            <a:spLocks noGrp="1"/>
+          </p:cNvSpPr>
+          <p:nvPr>
+            <p:ph sz="quarter" idx="10"/>
+          </p:nvPr>
+        </p:nvSpPr>
+        <p:spPr/>
+        <p:txBody>
+          <a:bodyPr>
+            <a:normAutofit/>
+          </a:bodyPr>
+          <a:lstStyle/>
+          <a:p>
+            <a:r>
+              <a:rPr lang="en-US" sz="2000" dirty="0"/>
+              <a:t>require '</a:t>
+            </a:r>
+            <a:r>
+              <a:rPr lang="en-US" sz="2000" dirty="0" err="1"/>
+              <a:t>spec_helper</a:t>
+            </a:r>
+            <a:r>
+              <a:rPr lang="en-US" sz="2000" dirty="0"/>
+              <a:t>'</a:t>
+            </a:r>
+          </a:p>
+          <a:p>
+            <a:endParaRPr lang="en-US" sz="2000" dirty="0"/>
+          </a:p>
+          <a:p>
+            <a:r>
+              <a:rPr lang="en-US" sz="2000" dirty="0"/>
+              <a:t>describe 'apache::default' do</a:t>
+            </a:r>
+          </a:p>
+          <a:p>
+            <a:r>
+              <a:rPr lang="en-US" sz="2000" dirty="0"/>
+              <a:t>  describe command('curl http://</a:t>
+            </a:r>
+            <a:r>
+              <a:rPr lang="en-US" sz="2000" dirty="0" err="1"/>
+              <a:t>localhost</a:t>
+            </a:r>
+            <a:r>
+              <a:rPr lang="en-US" sz="2000" dirty="0"/>
+              <a:t>') do</a:t>
+            </a:r>
+          </a:p>
+          <a:p>
+            <a:r>
+              <a:rPr lang="en-US" sz="2000" dirty="0"/>
+              <a:t>    its(:</a:t>
+            </a:r>
+            <a:r>
+              <a:rPr lang="en-US" sz="2000" dirty="0" err="1"/>
+              <a:t>stdout</a:t>
+            </a:r>
+            <a:r>
+              <a:rPr lang="en-US" sz="2000" dirty="0"/>
+              <a:t>) { should </a:t>
+            </a:r>
+            <a:r>
+              <a:rPr lang="en-US" sz="2000" dirty="0" smtClean="0"/>
+              <a:t>match(/Welcome users/) </a:t>
+            </a:r>
+            <a:r>
+              <a:rPr lang="en-US" sz="2000" dirty="0"/>
+              <a:t>}</a:t>
+            </a:r>
+          </a:p>
+          <a:p>
+            <a:r>
+              <a:rPr lang="en-US" sz="2000" dirty="0"/>
+              <a:t>  end</a:t>
+            </a:r>
+          </a:p>
+          <a:p>
+            <a:endParaRPr lang="en-US" sz="2000" dirty="0"/>
+          </a:p>
+          <a:p>
+            <a:r>
+              <a:rPr lang="en-US" sz="2000" dirty="0"/>
+              <a:t>  describe command('curl http://localhost:8080') do</a:t>
+            </a:r>
+          </a:p>
+          <a:p>
+            <a:r>
+              <a:rPr lang="en-US" sz="2000" dirty="0"/>
+              <a:t>    its(:</a:t>
+            </a:r>
+            <a:r>
+              <a:rPr lang="en-US" sz="2000" dirty="0" err="1"/>
+              <a:t>stdout</a:t>
+            </a:r>
+            <a:r>
+              <a:rPr lang="en-US" sz="2000" dirty="0"/>
+              <a:t>) { should match</a:t>
+            </a:r>
+            <a:r>
+              <a:rPr lang="en-US" sz="2000" dirty="0" smtClean="0"/>
+              <a:t>(/Welcome admins/) </a:t>
+            </a:r>
+            <a:r>
+              <a:rPr lang="en-US" sz="2000" dirty="0"/>
+              <a:t>}</a:t>
+            </a:r>
+          </a:p>
+          <a:p>
+            <a:r>
+              <a:rPr lang="en-US" sz="2000" dirty="0"/>
+              <a:t>  end</a:t>
+            </a:r>
+          </a:p>
+          <a:p>
+            <a:r>
+              <a:rPr lang="en-US" sz="2000" dirty="0"/>
+              <a:t>end</a:t>
+            </a:r>
+          </a:p>
+        </p:txBody>
+      </p:sp>
+      <p:sp>
+        <p:nvSpPr>
+          <p:cNvPr id="4" name="Text Placeholder 3"/>
+          <p:cNvSpPr>
+            <a:spLocks noGrp="1"/>
+          </p:cNvSpPr>
+          <p:nvPr>
+            <p:ph type="body" sz="quarter" idx="11"/>
+          </p:nvPr>
+        </p:nvSpPr>
+        <p:spPr/>
+        <p:txBody>
+          <a:bodyPr/>
+          <a:lstStyle/>
+          <a:p>
+            <a:r>
+              <a:rPr lang="en-US" dirty="0" smtClean="0"/>
+              <a:t>~/apache/test/integration/default/</a:t>
+            </a:r>
+            <a:r>
+              <a:rPr lang="en-US" dirty="0" err="1" smtClean="0"/>
+              <a:t>serverspec</a:t>
+            </a:r>
+            <a:r>
+              <a:rPr lang="en-US" dirty="0" smtClean="0"/>
+              <a:t>/</a:t>
+            </a:r>
+            <a:r>
+              <a:rPr lang="en-US" dirty="0" err="1" smtClean="0"/>
+              <a:t>default_spec.rb</a:t>
+            </a:r>
+            <a:endParaRPr lang="en-US" dirty="0"/>
+          </a:p>
+        </p:txBody>
+      </p:sp>
+      <p:sp>
+        <p:nvSpPr>
+          <p:cNvPr id="6" name="Text Placeholder 5"/>
+          <p:cNvSpPr>
+            <a:spLocks noGrp="1"/>
+          </p:cNvSpPr>
+          <p:nvPr>
+            <p:ph type="body" sz="quarter" idx="13"/>
+          </p:nvPr>
+        </p:nvSpPr>
+        <p:spPr>
+          <a:xfrm>
+            <a:off x="1135042" y="3729212"/>
+            <a:ext cx="14404273" cy="486419"/>
+          </a:xfrm>
+        </p:spPr>
+        <p:txBody>
+          <a:bodyPr/>
+          <a:lstStyle/>
+          <a:p>
+            <a:endParaRPr lang="en-US" dirty="0"/>
+          </a:p>
+        </p:txBody>
+      </p:sp>
+    </p:spTree>
+    <p:extLst>
+      <p:ext uri="{BB962C8B-B14F-4D97-AF65-F5344CB8AC3E}">
+        <p14:creationId xmlns:p14="http://schemas.microsoft.com/office/powerpoint/2010/main" val="1838042938"/>
+      </p:ext>
+    </p:extLst>
+  </p:cSld>
+  <p:clrMapOvr>
+    <a:masterClrMapping/>
+  </p:clrMapOvr>
+  <p:transition spd="med">
+    <p:fade/>
+  </p:transition>
+</p:sld>
+</file>
+
 <file path=ppt/slides/slide54.xml><?xml version="1.0" encoding="utf-8"?>
 <p:sld xmlns:a="http://schemas.openxmlformats.org/drawingml/2006/main" xmlns:r="http://schemas.openxmlformats.org/officeDocument/2006/relationships" xmlns:p="http://schemas.openxmlformats.org/presentationml/2006/main">
   <p:cSld>
@@ -23118,9 +23453,19 @@
         </p:nvSpPr>
         <p:spPr/>
         <p:txBody>
-          <a:bodyPr/>
+          <a:bodyPr>
+            <a:normAutofit fontScale="90000"/>
+          </a:bodyPr>
           <a:lstStyle/>
           <a:p>
+            <a:r>
+              <a:rPr lang="en-US" dirty="0" smtClean="0"/>
+              <a:t>Converging and Verifying the </a:t>
+            </a:r>
+            <a:r>
+              <a:rPr lang="en-US" smtClean="0"/>
+              <a:t>Test Instance</a:t>
+            </a:r>
             <a:endParaRPr lang="en-US"/>
           </a:p>
         </p:txBody>
@@ -23204,7 +23549,7 @@
         <p:spPr>
           <a:xfrm>
             <a:off x="1671638" y="3260725"/>
-            <a:ext cx="12319000" cy="4738164"/>
+            <a:ext cx="12319000" cy="4573090"/>
           </a:xfrm>
         </p:spPr>
         <p:txBody>
@@ -23213,7 +23558,7 @@
           <a:p>
             <a:pPr>
               <a:lnSpc>
-                <a:spcPct val="120000"/>
+                <a:spcPct val="150000"/>
               </a:lnSpc>
               <a:buFont typeface="Wingdings" charset="2"/>
               <a:buChar char="ü"/>
@@ -23234,11 +23579,11 @@
           <a:p>
             <a:pPr lvl="1" algn="l">
               <a:lnSpc>
-                <a:spcPct val="120000"/>
-              </a:lnSpc>
-            </a:pPr>
-            <a:r>
-              <a:rPr lang="en-US" sz="2400" dirty="0" smtClean="0">
+                <a:spcPct val="150000"/>
+              </a:lnSpc>
+            </a:pPr>
+            <a:r>
+              <a:rPr lang="en-US" sz="2400" i="1" dirty="0" smtClean="0">
                 <a:solidFill>
                   <a:schemeClr val="tx1"/>
                 </a:solidFill>
@@ -23249,91 +23594,112 @@
           <a:p>
             <a:pPr lvl="1" algn="l">
               <a:lnSpc>
-                <a:spcPct val="120000"/>
-              </a:lnSpc>
-            </a:pPr>
-            <a:r>
-              <a:rPr lang="en-US" sz="2400" dirty="0" smtClean="0">
+                <a:spcPct val="150000"/>
+              </a:lnSpc>
+            </a:pPr>
+            <a:r>
+              <a:rPr lang="en-US" sz="2400" i="1" dirty="0" smtClean="0">
                 <a:solidFill>
                   <a:schemeClr val="tx1"/>
                 </a:solidFill>
               </a:rPr>
               <a:t>Removes the configuration file</a:t>
             </a:r>
-          </a:p>
-          <a:p>
-            <a:pPr lvl="1" algn="l">
-              <a:lnSpc>
-                <a:spcPct val="120000"/>
-              </a:lnSpc>
-            </a:pPr>
-            <a:r>
-              <a:rPr lang="en-US" sz="2400" dirty="0" smtClean="0">
+            <a:endParaRPr lang="en-US" i="1" dirty="0" smtClean="0"/>
+          </a:p>
+          <a:p>
+            <a:pPr>
+              <a:lnSpc>
+                <a:spcPct val="150000"/>
+              </a:lnSpc>
+              <a:buFont typeface="Wingdings" charset="2"/>
+              <a:buChar char="ü"/>
+            </a:pPr>
+            <a:r>
+              <a:rPr lang="en-US" dirty="0" smtClean="0"/>
+              <a:t>Remove the default site by removing the 'welcome' apache </a:t>
+            </a:r>
+            <a:r>
+              <a:rPr lang="en-US" dirty="0" err="1" smtClean="0"/>
+              <a:t>vhost</a:t>
+            </a:r>
+            <a:endParaRPr lang="en-US" dirty="0" smtClean="0"/>
+          </a:p>
+          <a:p>
+            <a:pPr marL="609559" lvl="2" algn="l">
+              <a:lnSpc>
+                <a:spcPct val="150000"/>
+              </a:lnSpc>
+              <a:spcBef>
+                <a:spcPts val="0"/>
+              </a:spcBef>
+            </a:pPr>
+            <a:r>
+              <a:rPr lang="en-US" i="1" dirty="0" smtClean="0">
                 <a:solidFill>
                   <a:schemeClr val="tx1"/>
                 </a:solidFill>
               </a:rPr>
-              <a:t>Ensure if this resource takes action it will restart the Apache service</a:t>
-            </a:r>
-          </a:p>
-          <a:p>
-            <a:pPr>
-              <a:lnSpc>
-                <a:spcPct val="120000"/>
-              </a:lnSpc>
-            </a:pPr>
-            <a:endParaRPr lang="en-US" dirty="0" smtClean="0"/>
-          </a:p>
-          <a:p>
-            <a:pPr>
-              <a:lnSpc>
-                <a:spcPct val="120000"/>
+              <a:t>Ensure </a:t>
+            </a:r>
+            <a:r>
+              <a:rPr lang="en-US" i="1" dirty="0">
+                <a:solidFill>
+                  <a:schemeClr val="tx1"/>
+                </a:solidFill>
+              </a:rPr>
+              <a:t>if this resource takes action it will restart the Apache </a:t>
+            </a:r>
+            <a:r>
+              <a:rPr lang="en-US" i="1" dirty="0" smtClean="0">
+                <a:solidFill>
+                  <a:schemeClr val="tx1"/>
+                </a:solidFill>
+              </a:rPr>
+              <a:t>service</a:t>
+            </a:r>
+            <a:endParaRPr lang="en-US" i="1" dirty="0" smtClean="0"/>
+          </a:p>
+          <a:p>
+            <a:pPr>
+              <a:lnSpc>
+                <a:spcPct val="150000"/>
               </a:lnSpc>
               <a:buFont typeface="Wingdings" charset="2"/>
               <a:buChar char="ü"/>
             </a:pPr>
             <a:r>
-              <a:rPr lang="en-US" dirty="0"/>
-              <a:t>Remove the default site by removing the 'welcome' apache </a:t>
-            </a:r>
-            <a:r>
-              <a:rPr lang="en-US" dirty="0" err="1"/>
+              <a:rPr lang="en-US" dirty="0" smtClean="0"/>
+              <a:t>Add a 'users' apache </a:t>
+            </a:r>
+            <a:r>
+              <a:rPr lang="en-US" dirty="0" err="1" smtClean="0"/>
               <a:t>vhost</a:t>
             </a:r>
-            <a:endParaRPr lang="en-US" dirty="0"/>
-          </a:p>
-          <a:p>
-            <a:pPr>
-              <a:lnSpc>
-                <a:spcPct val="120000"/>
+            <a:r>
+              <a:rPr lang="en-US" dirty="0" smtClean="0"/>
+              <a:t> that is available on port 80</a:t>
+            </a:r>
+          </a:p>
+          <a:p>
+            <a:pPr>
+              <a:lnSpc>
+                <a:spcPct val="150000"/>
               </a:lnSpc>
               <a:buFont typeface="Wingdings" charset="2"/>
               <a:buChar char="ü"/>
             </a:pPr>
             <a:r>
-              <a:rPr lang="en-US" dirty="0" smtClean="0"/>
-              <a:t>Add a 'users' apache </a:t>
-            </a:r>
-            <a:r>
-              <a:rPr lang="en-US" dirty="0" err="1" smtClean="0"/>
-              <a:t>vhost</a:t>
-            </a:r>
-            <a:r>
-              <a:rPr lang="en-US" dirty="0" smtClean="0"/>
-              <a:t> that is available on port 80</a:t>
-            </a:r>
-          </a:p>
-          <a:p>
-            <a:pPr>
-              <a:lnSpc>
-                <a:spcPct val="120000"/>
-              </a:lnSpc>
-              <a:buFont typeface="Wingdings" charset="2"/>
-              <a:buChar char="ü"/>
-            </a:pPr>
-            <a:r>
               <a:rPr lang="en-US" dirty="0"/>
-              <a:t>Update the unit tests and integration tests to set expect the default site to "</a:t>
+              <a:t>Update the </a:t>
+            </a:r>
+            <a:r>
+              <a:rPr lang="en-US" dirty="0" smtClean="0"/>
+              <a:t>tests </a:t>
+            </a:r>
+            <a:r>
+              <a:rPr lang="en-US" dirty="0"/>
+              <a:t>to set expect the default site to "</a:t>
             </a:r>
             <a:r>
               <a:rPr lang="en-US" dirty="0" smtClean="0"/>
@@ -23346,7 +23712,7 @@
     </p:spTree>
     <p:extLst>
       <p:ext uri="{BB962C8B-B14F-4D97-AF65-F5344CB8AC3E}">
-        <p14:creationId xmlns:p14="http://schemas.microsoft.com/office/powerpoint/2010/main" val="1297764160"/>
+        <p14:creationId xmlns:p14="http://schemas.microsoft.com/office/powerpoint/2010/main" val="1957429357"/>
       </p:ext>
     </p:extLst>
   </p:cSld>
@@ -23418,11 +23784,7 @@
           <a:p>
             <a:r>
               <a:rPr lang="en-US" dirty="0" smtClean="0"/>
-              <a:t>What are the benefits of using a custom resource to manage the virtual </a:t>
-            </a:r>
-            <a:r>
-              <a:rPr lang="en-US" dirty="0" smtClean="0"/>
-              <a:t>hosts?</a:t>
+              <a:t>What are the benefits of using a custom resource to manage the virtual hosts?</a:t>
             </a:r>
             <a:r>
               <a:rPr lang="en-US" dirty="0"/>
@@ -23430,15 +23792,7 @@
             </a:r>
             <a:r>
               <a:rPr lang="en-US" dirty="0" smtClean="0"/>
-              <a:t>What </a:t>
-            </a:r>
-            <a:r>
-              <a:rPr lang="en-US" dirty="0" smtClean="0"/>
-              <a:t>are the drawbacks of using a custom resource</a:t>
-            </a:r>
-            <a:r>
-              <a:rPr lang="en-US" dirty="0" smtClean="0"/>
-              <a:t>?</a:t>
+              <a:t>What are the drawbacks of using a custom resource?</a:t>
             </a:r>
           </a:p>
           <a:p>
@@ -23782,7 +24136,11 @@
           <a:p>
             <a:r>
               <a:rPr lang="en-US" dirty="0" smtClean="0"/>
-              <a:t>Review the Existing Unit Tests</a:t>
+              <a:t>Reviewing </a:t>
+            </a:r>
+            <a:r>
+              <a:rPr lang="en-US" dirty="0" smtClean="0"/>
+              <a:t>the Existing Unit Tests</a:t>
             </a:r>
             <a:endParaRPr lang="en-US" dirty="0"/>
           </a:p>
@@ -24056,7 +24414,11 @@
           <a:p>
             <a:r>
               <a:rPr lang="en-US" dirty="0" smtClean="0"/>
-              <a:t>Review the Existing Unit Tests</a:t>
+              <a:t>Reviewing </a:t>
+            </a:r>
+            <a:r>
+              <a:rPr lang="en-US" dirty="0" smtClean="0"/>
+              <a:t>the Existing Unit Tests</a:t>
             </a:r>
             <a:endParaRPr lang="en-US" dirty="0"/>
           </a:p>
@@ -24343,7 +24705,11 @@
           <a:p>
             <a:r>
               <a:rPr lang="en-US" dirty="0" smtClean="0"/>
-              <a:t>Review the Existing Unit Tests</a:t>
+              <a:t>Reviewing </a:t>
+            </a:r>
+            <a:r>
+              <a:rPr lang="en-US" dirty="0" smtClean="0"/>
+              <a:t>the Existing Unit Tests</a:t>
             </a:r>
             <a:endParaRPr lang="en-US" dirty="0"/>
           </a:p>

</xml_diff>